<commit_message>
added TVAAS visuals and updated code
</commit_message>
<xml_diff>
--- a/Performance and Geography.pptx
+++ b/Performance and Geography.pptx
@@ -6,7 +6,7 @@
     <p:sldMasterId id="2147483881" r:id="rId2"/>
   </p:sldMasterIdLst>
   <p:notesMasterIdLst>
-    <p:notesMasterId r:id="rId11"/>
+    <p:notesMasterId r:id="rId17"/>
   </p:notesMasterIdLst>
   <p:sldIdLst>
     <p:sldId id="852" r:id="rId3"/>
@@ -16,7 +16,13 @@
     <p:sldId id="892" r:id="rId7"/>
     <p:sldId id="891" r:id="rId8"/>
     <p:sldId id="896" r:id="rId9"/>
-    <p:sldId id="890" r:id="rId10"/>
+    <p:sldId id="899" r:id="rId10"/>
+    <p:sldId id="900" r:id="rId11"/>
+    <p:sldId id="901" r:id="rId12"/>
+    <p:sldId id="902" r:id="rId13"/>
+    <p:sldId id="898" r:id="rId14"/>
+    <p:sldId id="897" r:id="rId15"/>
+    <p:sldId id="890" r:id="rId16"/>
   </p:sldIdLst>
   <p:sldSz cx="9144000" cy="6858000" type="screen4x3"/>
   <p:notesSz cx="6950075" cy="9236075"/>
@@ -127,6 +133,12 @@
             <p14:sldId id="892"/>
             <p14:sldId id="891"/>
             <p14:sldId id="896"/>
+            <p14:sldId id="899"/>
+            <p14:sldId id="900"/>
+            <p14:sldId id="901"/>
+            <p14:sldId id="902"/>
+            <p14:sldId id="898"/>
+            <p14:sldId id="897"/>
             <p14:sldId id="890"/>
           </p14:sldIdLst>
         </p14:section>
@@ -650,6 +662,342 @@
 </p:notes>
 </file>
 
+<file path=ppt/notesSlides/notesSlide10.xml><?xml version="1.0" encoding="utf-8"?>
+<p:notes xmlns:a="http://schemas.openxmlformats.org/drawingml/2006/main" xmlns:r="http://schemas.openxmlformats.org/officeDocument/2006/relationships" xmlns:p="http://schemas.openxmlformats.org/presentationml/2006/main">
+  <p:cSld>
+    <p:spTree>
+      <p:nvGrpSpPr>
+        <p:cNvPr id="1" name=""/>
+        <p:cNvGrpSpPr/>
+        <p:nvPr/>
+      </p:nvGrpSpPr>
+      <p:grpSpPr>
+        <a:xfrm>
+          <a:off x="0" y="0"/>
+          <a:ext cx="0" cy="0"/>
+          <a:chOff x="0" y="0"/>
+          <a:chExt cx="0" cy="0"/>
+        </a:xfrm>
+      </p:grpSpPr>
+      <p:sp>
+        <p:nvSpPr>
+          <p:cNvPr id="2" name="Slide Image Placeholder 1"/>
+          <p:cNvSpPr>
+            <a:spLocks noGrp="1" noRot="1" noChangeAspect="1"/>
+          </p:cNvSpPr>
+          <p:nvPr>
+            <p:ph type="sldImg"/>
+          </p:nvPr>
+        </p:nvSpPr>
+        <p:spPr/>
+      </p:sp>
+      <p:sp>
+        <p:nvSpPr>
+          <p:cNvPr id="3" name="Notes Placeholder 2"/>
+          <p:cNvSpPr>
+            <a:spLocks noGrp="1"/>
+          </p:cNvSpPr>
+          <p:nvPr>
+            <p:ph type="body" idx="1"/>
+          </p:nvPr>
+        </p:nvSpPr>
+        <p:spPr/>
+        <p:txBody>
+          <a:bodyPr/>
+          <a:lstStyle/>
+          <a:p>
+            <a:endParaRPr lang="en-US" dirty="0"/>
+          </a:p>
+        </p:txBody>
+      </p:sp>
+      <p:sp>
+        <p:nvSpPr>
+          <p:cNvPr id="4" name="Slide Number Placeholder 3"/>
+          <p:cNvSpPr>
+            <a:spLocks noGrp="1"/>
+          </p:cNvSpPr>
+          <p:nvPr>
+            <p:ph type="sldNum" sz="quarter" idx="10"/>
+          </p:nvPr>
+        </p:nvSpPr>
+        <p:spPr/>
+        <p:txBody>
+          <a:bodyPr/>
+          <a:lstStyle/>
+          <a:p>
+            <a:fld id="{EF3C1CD0-D833-4B0D-BF33-74A8E63C0BDA}" type="slidenum">
+              <a:rPr lang="en-US" smtClean="0"/>
+              <a:t>10</a:t>
+            </a:fld>
+            <a:endParaRPr lang="en-US" dirty="0"/>
+          </a:p>
+        </p:txBody>
+      </p:sp>
+    </p:spTree>
+    <p:extLst>
+      <p:ext uri="{BB962C8B-B14F-4D97-AF65-F5344CB8AC3E}">
+        <p14:creationId xmlns:p14="http://schemas.microsoft.com/office/powerpoint/2010/main" val="2909111510"/>
+      </p:ext>
+    </p:extLst>
+  </p:cSld>
+  <p:clrMapOvr>
+    <a:masterClrMapping/>
+  </p:clrMapOvr>
+</p:notes>
+</file>
+
+<file path=ppt/notesSlides/notesSlide11.xml><?xml version="1.0" encoding="utf-8"?>
+<p:notes xmlns:a="http://schemas.openxmlformats.org/drawingml/2006/main" xmlns:r="http://schemas.openxmlformats.org/officeDocument/2006/relationships" xmlns:p="http://schemas.openxmlformats.org/presentationml/2006/main">
+  <p:cSld>
+    <p:spTree>
+      <p:nvGrpSpPr>
+        <p:cNvPr id="1" name=""/>
+        <p:cNvGrpSpPr/>
+        <p:nvPr/>
+      </p:nvGrpSpPr>
+      <p:grpSpPr>
+        <a:xfrm>
+          <a:off x="0" y="0"/>
+          <a:ext cx="0" cy="0"/>
+          <a:chOff x="0" y="0"/>
+          <a:chExt cx="0" cy="0"/>
+        </a:xfrm>
+      </p:grpSpPr>
+      <p:sp>
+        <p:nvSpPr>
+          <p:cNvPr id="2" name="Slide Image Placeholder 1"/>
+          <p:cNvSpPr>
+            <a:spLocks noGrp="1" noRot="1" noChangeAspect="1"/>
+          </p:cNvSpPr>
+          <p:nvPr>
+            <p:ph type="sldImg"/>
+          </p:nvPr>
+        </p:nvSpPr>
+        <p:spPr/>
+      </p:sp>
+      <p:sp>
+        <p:nvSpPr>
+          <p:cNvPr id="3" name="Notes Placeholder 2"/>
+          <p:cNvSpPr>
+            <a:spLocks noGrp="1"/>
+          </p:cNvSpPr>
+          <p:nvPr>
+            <p:ph type="body" idx="1"/>
+          </p:nvPr>
+        </p:nvSpPr>
+        <p:spPr/>
+        <p:txBody>
+          <a:bodyPr/>
+          <a:lstStyle/>
+          <a:p>
+            <a:endParaRPr lang="en-US" dirty="0"/>
+          </a:p>
+        </p:txBody>
+      </p:sp>
+      <p:sp>
+        <p:nvSpPr>
+          <p:cNvPr id="4" name="Slide Number Placeholder 3"/>
+          <p:cNvSpPr>
+            <a:spLocks noGrp="1"/>
+          </p:cNvSpPr>
+          <p:nvPr>
+            <p:ph type="sldNum" sz="quarter" idx="10"/>
+          </p:nvPr>
+        </p:nvSpPr>
+        <p:spPr/>
+        <p:txBody>
+          <a:bodyPr/>
+          <a:lstStyle/>
+          <a:p>
+            <a:fld id="{EF3C1CD0-D833-4B0D-BF33-74A8E63C0BDA}" type="slidenum">
+              <a:rPr lang="en-US" smtClean="0"/>
+              <a:t>11</a:t>
+            </a:fld>
+            <a:endParaRPr lang="en-US" dirty="0"/>
+          </a:p>
+        </p:txBody>
+      </p:sp>
+    </p:spTree>
+    <p:extLst>
+      <p:ext uri="{BB962C8B-B14F-4D97-AF65-F5344CB8AC3E}">
+        <p14:creationId xmlns:p14="http://schemas.microsoft.com/office/powerpoint/2010/main" val="3328983218"/>
+      </p:ext>
+    </p:extLst>
+  </p:cSld>
+  <p:clrMapOvr>
+    <a:masterClrMapping/>
+  </p:clrMapOvr>
+</p:notes>
+</file>
+
+<file path=ppt/notesSlides/notesSlide12.xml><?xml version="1.0" encoding="utf-8"?>
+<p:notes xmlns:a="http://schemas.openxmlformats.org/drawingml/2006/main" xmlns:r="http://schemas.openxmlformats.org/officeDocument/2006/relationships" xmlns:p="http://schemas.openxmlformats.org/presentationml/2006/main">
+  <p:cSld>
+    <p:spTree>
+      <p:nvGrpSpPr>
+        <p:cNvPr id="1" name=""/>
+        <p:cNvGrpSpPr/>
+        <p:nvPr/>
+      </p:nvGrpSpPr>
+      <p:grpSpPr>
+        <a:xfrm>
+          <a:off x="0" y="0"/>
+          <a:ext cx="0" cy="0"/>
+          <a:chOff x="0" y="0"/>
+          <a:chExt cx="0" cy="0"/>
+        </a:xfrm>
+      </p:grpSpPr>
+      <p:sp>
+        <p:nvSpPr>
+          <p:cNvPr id="2" name="Slide Image Placeholder 1"/>
+          <p:cNvSpPr>
+            <a:spLocks noGrp="1" noRot="1" noChangeAspect="1"/>
+          </p:cNvSpPr>
+          <p:nvPr>
+            <p:ph type="sldImg"/>
+          </p:nvPr>
+        </p:nvSpPr>
+        <p:spPr/>
+      </p:sp>
+      <p:sp>
+        <p:nvSpPr>
+          <p:cNvPr id="3" name="Notes Placeholder 2"/>
+          <p:cNvSpPr>
+            <a:spLocks noGrp="1"/>
+          </p:cNvSpPr>
+          <p:nvPr>
+            <p:ph type="body" idx="1"/>
+          </p:nvPr>
+        </p:nvSpPr>
+        <p:spPr/>
+        <p:txBody>
+          <a:bodyPr/>
+          <a:lstStyle/>
+          <a:p>
+            <a:endParaRPr lang="en-US" dirty="0"/>
+          </a:p>
+        </p:txBody>
+      </p:sp>
+      <p:sp>
+        <p:nvSpPr>
+          <p:cNvPr id="4" name="Slide Number Placeholder 3"/>
+          <p:cNvSpPr>
+            <a:spLocks noGrp="1"/>
+          </p:cNvSpPr>
+          <p:nvPr>
+            <p:ph type="sldNum" sz="quarter" idx="10"/>
+          </p:nvPr>
+        </p:nvSpPr>
+        <p:spPr/>
+        <p:txBody>
+          <a:bodyPr/>
+          <a:lstStyle/>
+          <a:p>
+            <a:fld id="{EF3C1CD0-D833-4B0D-BF33-74A8E63C0BDA}" type="slidenum">
+              <a:rPr lang="en-US" smtClean="0"/>
+              <a:t>12</a:t>
+            </a:fld>
+            <a:endParaRPr lang="en-US" dirty="0"/>
+          </a:p>
+        </p:txBody>
+      </p:sp>
+    </p:spTree>
+    <p:extLst>
+      <p:ext uri="{BB962C8B-B14F-4D97-AF65-F5344CB8AC3E}">
+        <p14:creationId xmlns:p14="http://schemas.microsoft.com/office/powerpoint/2010/main" val="965144725"/>
+      </p:ext>
+    </p:extLst>
+  </p:cSld>
+  <p:clrMapOvr>
+    <a:masterClrMapping/>
+  </p:clrMapOvr>
+</p:notes>
+</file>
+
+<file path=ppt/notesSlides/notesSlide13.xml><?xml version="1.0" encoding="utf-8"?>
+<p:notes xmlns:a="http://schemas.openxmlformats.org/drawingml/2006/main" xmlns:r="http://schemas.openxmlformats.org/officeDocument/2006/relationships" xmlns:p="http://schemas.openxmlformats.org/presentationml/2006/main">
+  <p:cSld>
+    <p:spTree>
+      <p:nvGrpSpPr>
+        <p:cNvPr id="1" name=""/>
+        <p:cNvGrpSpPr/>
+        <p:nvPr/>
+      </p:nvGrpSpPr>
+      <p:grpSpPr>
+        <a:xfrm>
+          <a:off x="0" y="0"/>
+          <a:ext cx="0" cy="0"/>
+          <a:chOff x="0" y="0"/>
+          <a:chExt cx="0" cy="0"/>
+        </a:xfrm>
+      </p:grpSpPr>
+      <p:sp>
+        <p:nvSpPr>
+          <p:cNvPr id="2" name="Slide Image Placeholder 1"/>
+          <p:cNvSpPr>
+            <a:spLocks noGrp="1" noRot="1" noChangeAspect="1"/>
+          </p:cNvSpPr>
+          <p:nvPr>
+            <p:ph type="sldImg"/>
+          </p:nvPr>
+        </p:nvSpPr>
+        <p:spPr/>
+      </p:sp>
+      <p:sp>
+        <p:nvSpPr>
+          <p:cNvPr id="3" name="Notes Placeholder 2"/>
+          <p:cNvSpPr>
+            <a:spLocks noGrp="1"/>
+          </p:cNvSpPr>
+          <p:nvPr>
+            <p:ph type="body" idx="1"/>
+          </p:nvPr>
+        </p:nvSpPr>
+        <p:spPr/>
+        <p:txBody>
+          <a:bodyPr/>
+          <a:lstStyle/>
+          <a:p>
+            <a:endParaRPr lang="en-US" dirty="0"/>
+          </a:p>
+        </p:txBody>
+      </p:sp>
+      <p:sp>
+        <p:nvSpPr>
+          <p:cNvPr id="4" name="Slide Number Placeholder 3"/>
+          <p:cNvSpPr>
+            <a:spLocks noGrp="1"/>
+          </p:cNvSpPr>
+          <p:nvPr>
+            <p:ph type="sldNum" sz="quarter" idx="10"/>
+          </p:nvPr>
+        </p:nvSpPr>
+        <p:spPr/>
+        <p:txBody>
+          <a:bodyPr/>
+          <a:lstStyle/>
+          <a:p>
+            <a:fld id="{EF3C1CD0-D833-4B0D-BF33-74A8E63C0BDA}" type="slidenum">
+              <a:rPr lang="en-US" smtClean="0"/>
+              <a:t>13</a:t>
+            </a:fld>
+            <a:endParaRPr lang="en-US" dirty="0"/>
+          </a:p>
+        </p:txBody>
+      </p:sp>
+    </p:spTree>
+    <p:extLst>
+      <p:ext uri="{BB962C8B-B14F-4D97-AF65-F5344CB8AC3E}">
+        <p14:creationId xmlns:p14="http://schemas.microsoft.com/office/powerpoint/2010/main" val="3846542780"/>
+      </p:ext>
+    </p:extLst>
+  </p:cSld>
+  <p:clrMapOvr>
+    <a:masterClrMapping/>
+  </p:clrMapOvr>
+</p:notes>
+</file>
+
 <file path=ppt/notesSlides/notesSlide2.xml><?xml version="1.0" encoding="utf-8"?>
 <p:notes xmlns:a="http://schemas.openxmlformats.org/drawingml/2006/main" xmlns:r="http://schemas.openxmlformats.org/officeDocument/2006/relationships" xmlns:p="http://schemas.openxmlformats.org/presentationml/2006/main">
   <p:cSld>
@@ -1145,6 +1493,174 @@
     <p:extLst>
       <p:ext uri="{BB962C8B-B14F-4D97-AF65-F5344CB8AC3E}">
         <p14:creationId xmlns:p14="http://schemas.microsoft.com/office/powerpoint/2010/main" val="4294082221"/>
+      </p:ext>
+    </p:extLst>
+  </p:cSld>
+  <p:clrMapOvr>
+    <a:masterClrMapping/>
+  </p:clrMapOvr>
+</p:notes>
+</file>
+
+<file path=ppt/notesSlides/notesSlide8.xml><?xml version="1.0" encoding="utf-8"?>
+<p:notes xmlns:a="http://schemas.openxmlformats.org/drawingml/2006/main" xmlns:r="http://schemas.openxmlformats.org/officeDocument/2006/relationships" xmlns:p="http://schemas.openxmlformats.org/presentationml/2006/main">
+  <p:cSld>
+    <p:spTree>
+      <p:nvGrpSpPr>
+        <p:cNvPr id="1" name=""/>
+        <p:cNvGrpSpPr/>
+        <p:nvPr/>
+      </p:nvGrpSpPr>
+      <p:grpSpPr>
+        <a:xfrm>
+          <a:off x="0" y="0"/>
+          <a:ext cx="0" cy="0"/>
+          <a:chOff x="0" y="0"/>
+          <a:chExt cx="0" cy="0"/>
+        </a:xfrm>
+      </p:grpSpPr>
+      <p:sp>
+        <p:nvSpPr>
+          <p:cNvPr id="2" name="Slide Image Placeholder 1"/>
+          <p:cNvSpPr>
+            <a:spLocks noGrp="1" noRot="1" noChangeAspect="1"/>
+          </p:cNvSpPr>
+          <p:nvPr>
+            <p:ph type="sldImg"/>
+          </p:nvPr>
+        </p:nvSpPr>
+        <p:spPr/>
+      </p:sp>
+      <p:sp>
+        <p:nvSpPr>
+          <p:cNvPr id="3" name="Notes Placeholder 2"/>
+          <p:cNvSpPr>
+            <a:spLocks noGrp="1"/>
+          </p:cNvSpPr>
+          <p:nvPr>
+            <p:ph type="body" idx="1"/>
+          </p:nvPr>
+        </p:nvSpPr>
+        <p:spPr/>
+        <p:txBody>
+          <a:bodyPr/>
+          <a:lstStyle/>
+          <a:p>
+            <a:endParaRPr lang="en-US" dirty="0"/>
+          </a:p>
+        </p:txBody>
+      </p:sp>
+      <p:sp>
+        <p:nvSpPr>
+          <p:cNvPr id="4" name="Slide Number Placeholder 3"/>
+          <p:cNvSpPr>
+            <a:spLocks noGrp="1"/>
+          </p:cNvSpPr>
+          <p:nvPr>
+            <p:ph type="sldNum" sz="quarter" idx="10"/>
+          </p:nvPr>
+        </p:nvSpPr>
+        <p:spPr/>
+        <p:txBody>
+          <a:bodyPr/>
+          <a:lstStyle/>
+          <a:p>
+            <a:fld id="{EF3C1CD0-D833-4B0D-BF33-74A8E63C0BDA}" type="slidenum">
+              <a:rPr lang="en-US" smtClean="0"/>
+              <a:t>8</a:t>
+            </a:fld>
+            <a:endParaRPr lang="en-US" dirty="0"/>
+          </a:p>
+        </p:txBody>
+      </p:sp>
+    </p:spTree>
+    <p:extLst>
+      <p:ext uri="{BB962C8B-B14F-4D97-AF65-F5344CB8AC3E}">
+        <p14:creationId xmlns:p14="http://schemas.microsoft.com/office/powerpoint/2010/main" val="3805273904"/>
+      </p:ext>
+    </p:extLst>
+  </p:cSld>
+  <p:clrMapOvr>
+    <a:masterClrMapping/>
+  </p:clrMapOvr>
+</p:notes>
+</file>
+
+<file path=ppt/notesSlides/notesSlide9.xml><?xml version="1.0" encoding="utf-8"?>
+<p:notes xmlns:a="http://schemas.openxmlformats.org/drawingml/2006/main" xmlns:r="http://schemas.openxmlformats.org/officeDocument/2006/relationships" xmlns:p="http://schemas.openxmlformats.org/presentationml/2006/main">
+  <p:cSld>
+    <p:spTree>
+      <p:nvGrpSpPr>
+        <p:cNvPr id="1" name=""/>
+        <p:cNvGrpSpPr/>
+        <p:nvPr/>
+      </p:nvGrpSpPr>
+      <p:grpSpPr>
+        <a:xfrm>
+          <a:off x="0" y="0"/>
+          <a:ext cx="0" cy="0"/>
+          <a:chOff x="0" y="0"/>
+          <a:chExt cx="0" cy="0"/>
+        </a:xfrm>
+      </p:grpSpPr>
+      <p:sp>
+        <p:nvSpPr>
+          <p:cNvPr id="2" name="Slide Image Placeholder 1"/>
+          <p:cNvSpPr>
+            <a:spLocks noGrp="1" noRot="1" noChangeAspect="1"/>
+          </p:cNvSpPr>
+          <p:nvPr>
+            <p:ph type="sldImg"/>
+          </p:nvPr>
+        </p:nvSpPr>
+        <p:spPr/>
+      </p:sp>
+      <p:sp>
+        <p:nvSpPr>
+          <p:cNvPr id="3" name="Notes Placeholder 2"/>
+          <p:cNvSpPr>
+            <a:spLocks noGrp="1"/>
+          </p:cNvSpPr>
+          <p:nvPr>
+            <p:ph type="body" idx="1"/>
+          </p:nvPr>
+        </p:nvSpPr>
+        <p:spPr/>
+        <p:txBody>
+          <a:bodyPr/>
+          <a:lstStyle/>
+          <a:p>
+            <a:endParaRPr lang="en-US" dirty="0"/>
+          </a:p>
+        </p:txBody>
+      </p:sp>
+      <p:sp>
+        <p:nvSpPr>
+          <p:cNvPr id="4" name="Slide Number Placeholder 3"/>
+          <p:cNvSpPr>
+            <a:spLocks noGrp="1"/>
+          </p:cNvSpPr>
+          <p:nvPr>
+            <p:ph type="sldNum" sz="quarter" idx="10"/>
+          </p:nvPr>
+        </p:nvSpPr>
+        <p:spPr/>
+        <p:txBody>
+          <a:bodyPr/>
+          <a:lstStyle/>
+          <a:p>
+            <a:fld id="{EF3C1CD0-D833-4B0D-BF33-74A8E63C0BDA}" type="slidenum">
+              <a:rPr lang="en-US" smtClean="0"/>
+              <a:t>9</a:t>
+            </a:fld>
+            <a:endParaRPr lang="en-US" dirty="0"/>
+          </a:p>
+        </p:txBody>
+      </p:sp>
+    </p:spTree>
+    <p:extLst>
+      <p:ext uri="{BB962C8B-B14F-4D97-AF65-F5344CB8AC3E}">
+        <p14:creationId xmlns:p14="http://schemas.microsoft.com/office/powerpoint/2010/main" val="700071694"/>
       </p:ext>
     </p:extLst>
   </p:cSld>
@@ -10702,6 +11218,380 @@
 </p:sld>
 </file>
 
+<file path=ppt/slides/slide10.xml><?xml version="1.0" encoding="utf-8"?>
+<p:sld xmlns:a="http://schemas.openxmlformats.org/drawingml/2006/main" xmlns:r="http://schemas.openxmlformats.org/officeDocument/2006/relationships" xmlns:p="http://schemas.openxmlformats.org/presentationml/2006/main">
+  <p:cSld>
+    <p:spTree>
+      <p:nvGrpSpPr>
+        <p:cNvPr id="1" name=""/>
+        <p:cNvGrpSpPr/>
+        <p:nvPr/>
+      </p:nvGrpSpPr>
+      <p:grpSpPr>
+        <a:xfrm>
+          <a:off x="0" y="0"/>
+          <a:ext cx="0" cy="0"/>
+          <a:chOff x="0" y="0"/>
+          <a:chExt cx="0" cy="0"/>
+        </a:xfrm>
+      </p:grpSpPr>
+      <p:sp>
+        <p:nvSpPr>
+          <p:cNvPr id="3" name="Title 2"/>
+          <p:cNvSpPr>
+            <a:spLocks noGrp="1"/>
+          </p:cNvSpPr>
+          <p:nvPr>
+            <p:ph type="title"/>
+          </p:nvPr>
+        </p:nvSpPr>
+        <p:spPr/>
+        <p:txBody>
+          <a:bodyPr>
+            <a:normAutofit/>
+          </a:bodyPr>
+          <a:lstStyle/>
+          <a:p>
+            <a:r>
+              <a:rPr lang="en-US" dirty="0"/>
+              <a:t>TVAAS Ranking</a:t>
+            </a:r>
+            <a:endParaRPr lang="en-US" dirty="0"/>
+          </a:p>
+        </p:txBody>
+      </p:sp>
+      <p:pic>
+        <p:nvPicPr>
+          <p:cNvPr id="4" name="Content Placeholder 3"/>
+          <p:cNvPicPr>
+            <a:picLocks noGrp="1" noChangeAspect="1"/>
+          </p:cNvPicPr>
+          <p:nvPr>
+            <p:ph idx="1"/>
+          </p:nvPr>
+        </p:nvPicPr>
+        <p:blipFill>
+          <a:blip r:embed="rId3" cstate="print">
+            <a:extLst>
+              <a:ext uri="{28A0092B-C50C-407E-A947-70E740481C1C}">
+                <a14:useLocalDpi xmlns:a14="http://schemas.microsoft.com/office/drawing/2010/main" val="0"/>
+              </a:ext>
+            </a:extLst>
+          </a:blip>
+          <a:stretch>
+            <a:fillRect/>
+          </a:stretch>
+        </p:blipFill>
+        <p:spPr/>
+      </p:pic>
+    </p:spTree>
+    <p:extLst>
+      <p:ext uri="{BB962C8B-B14F-4D97-AF65-F5344CB8AC3E}">
+        <p14:creationId xmlns:p14="http://schemas.microsoft.com/office/powerpoint/2010/main" val="2403559157"/>
+      </p:ext>
+    </p:extLst>
+  </p:cSld>
+  <p:clrMapOvr>
+    <a:masterClrMapping/>
+  </p:clrMapOvr>
+  <p:timing>
+    <p:tnLst>
+      <p:par>
+        <p:cTn id="1" dur="indefinite" restart="never" nodeType="tmRoot"/>
+      </p:par>
+    </p:tnLst>
+  </p:timing>
+</p:sld>
+</file>
+
+<file path=ppt/slides/slide11.xml><?xml version="1.0" encoding="utf-8"?>
+<p:sld xmlns:a="http://schemas.openxmlformats.org/drawingml/2006/main" xmlns:r="http://schemas.openxmlformats.org/officeDocument/2006/relationships" xmlns:p="http://schemas.openxmlformats.org/presentationml/2006/main">
+  <p:cSld>
+    <p:spTree>
+      <p:nvGrpSpPr>
+        <p:cNvPr id="1" name=""/>
+        <p:cNvGrpSpPr/>
+        <p:nvPr/>
+      </p:nvGrpSpPr>
+      <p:grpSpPr>
+        <a:xfrm>
+          <a:off x="0" y="0"/>
+          <a:ext cx="0" cy="0"/>
+          <a:chOff x="0" y="0"/>
+          <a:chExt cx="0" cy="0"/>
+        </a:xfrm>
+      </p:grpSpPr>
+      <p:sp>
+        <p:nvSpPr>
+          <p:cNvPr id="3" name="Title 2"/>
+          <p:cNvSpPr>
+            <a:spLocks noGrp="1"/>
+          </p:cNvSpPr>
+          <p:nvPr>
+            <p:ph type="title"/>
+          </p:nvPr>
+        </p:nvSpPr>
+        <p:spPr/>
+        <p:txBody>
+          <a:bodyPr>
+            <a:normAutofit/>
+          </a:bodyPr>
+          <a:lstStyle/>
+          <a:p>
+            <a:r>
+              <a:rPr lang="en-US" dirty="0"/>
+              <a:t>TVAAS Ranking</a:t>
+            </a:r>
+            <a:endParaRPr lang="en-US" dirty="0"/>
+          </a:p>
+        </p:txBody>
+      </p:sp>
+      <p:pic>
+        <p:nvPicPr>
+          <p:cNvPr id="4" name="Content Placeholder 3"/>
+          <p:cNvPicPr>
+            <a:picLocks noGrp="1" noChangeAspect="1"/>
+          </p:cNvPicPr>
+          <p:nvPr>
+            <p:ph idx="1"/>
+          </p:nvPr>
+        </p:nvPicPr>
+        <p:blipFill>
+          <a:blip r:embed="rId3" cstate="print">
+            <a:extLst>
+              <a:ext uri="{28A0092B-C50C-407E-A947-70E740481C1C}">
+                <a14:useLocalDpi xmlns:a14="http://schemas.microsoft.com/office/drawing/2010/main" val="0"/>
+              </a:ext>
+            </a:extLst>
+          </a:blip>
+          <a:stretch>
+            <a:fillRect/>
+          </a:stretch>
+        </p:blipFill>
+        <p:spPr/>
+      </p:pic>
+    </p:spTree>
+    <p:extLst>
+      <p:ext uri="{BB962C8B-B14F-4D97-AF65-F5344CB8AC3E}">
+        <p14:creationId xmlns:p14="http://schemas.microsoft.com/office/powerpoint/2010/main" val="812432111"/>
+      </p:ext>
+    </p:extLst>
+  </p:cSld>
+  <p:clrMapOvr>
+    <a:masterClrMapping/>
+  </p:clrMapOvr>
+  <p:timing>
+    <p:tnLst>
+      <p:par>
+        <p:cTn id="1" dur="indefinite" restart="never" nodeType="tmRoot"/>
+      </p:par>
+    </p:tnLst>
+  </p:timing>
+</p:sld>
+</file>
+
+<file path=ppt/slides/slide12.xml><?xml version="1.0" encoding="utf-8"?>
+<p:sld xmlns:a="http://schemas.openxmlformats.org/drawingml/2006/main" xmlns:r="http://schemas.openxmlformats.org/officeDocument/2006/relationships" xmlns:p="http://schemas.openxmlformats.org/presentationml/2006/main">
+  <p:cSld>
+    <p:spTree>
+      <p:nvGrpSpPr>
+        <p:cNvPr id="1" name=""/>
+        <p:cNvGrpSpPr/>
+        <p:nvPr/>
+      </p:nvGrpSpPr>
+      <p:grpSpPr>
+        <a:xfrm>
+          <a:off x="0" y="0"/>
+          <a:ext cx="0" cy="0"/>
+          <a:chOff x="0" y="0"/>
+          <a:chExt cx="0" cy="0"/>
+        </a:xfrm>
+      </p:grpSpPr>
+      <p:sp>
+        <p:nvSpPr>
+          <p:cNvPr id="3" name="Title 2"/>
+          <p:cNvSpPr>
+            <a:spLocks noGrp="1"/>
+          </p:cNvSpPr>
+          <p:nvPr>
+            <p:ph type="title"/>
+          </p:nvPr>
+        </p:nvSpPr>
+        <p:spPr/>
+        <p:txBody>
+          <a:bodyPr>
+            <a:normAutofit/>
+          </a:bodyPr>
+          <a:lstStyle/>
+          <a:p>
+            <a:r>
+              <a:rPr lang="en-US" dirty="0"/>
+              <a:t>TVAAS Ranking</a:t>
+            </a:r>
+            <a:endParaRPr lang="en-US" dirty="0"/>
+          </a:p>
+        </p:txBody>
+      </p:sp>
+      <p:pic>
+        <p:nvPicPr>
+          <p:cNvPr id="4" name="Content Placeholder 3"/>
+          <p:cNvPicPr>
+            <a:picLocks noGrp="1" noChangeAspect="1"/>
+          </p:cNvPicPr>
+          <p:nvPr>
+            <p:ph idx="1"/>
+          </p:nvPr>
+        </p:nvPicPr>
+        <p:blipFill>
+          <a:blip r:embed="rId3" cstate="print">
+            <a:extLst>
+              <a:ext uri="{28A0092B-C50C-407E-A947-70E740481C1C}">
+                <a14:useLocalDpi xmlns:a14="http://schemas.microsoft.com/office/drawing/2010/main" val="0"/>
+              </a:ext>
+            </a:extLst>
+          </a:blip>
+          <a:stretch>
+            <a:fillRect/>
+          </a:stretch>
+        </p:blipFill>
+        <p:spPr/>
+      </p:pic>
+    </p:spTree>
+    <p:extLst>
+      <p:ext uri="{BB962C8B-B14F-4D97-AF65-F5344CB8AC3E}">
+        <p14:creationId xmlns:p14="http://schemas.microsoft.com/office/powerpoint/2010/main" val="1049921178"/>
+      </p:ext>
+    </p:extLst>
+  </p:cSld>
+  <p:clrMapOvr>
+    <a:masterClrMapping/>
+  </p:clrMapOvr>
+  <p:timing>
+    <p:tnLst>
+      <p:par>
+        <p:cTn id="1" dur="indefinite" restart="never" nodeType="tmRoot"/>
+      </p:par>
+    </p:tnLst>
+  </p:timing>
+</p:sld>
+</file>
+
+<file path=ppt/slides/slide13.xml><?xml version="1.0" encoding="utf-8"?>
+<p:sld xmlns:a="http://schemas.openxmlformats.org/drawingml/2006/main" xmlns:r="http://schemas.openxmlformats.org/officeDocument/2006/relationships" xmlns:p="http://schemas.openxmlformats.org/presentationml/2006/main">
+  <p:cSld>
+    <p:spTree>
+      <p:nvGrpSpPr>
+        <p:cNvPr id="1" name=""/>
+        <p:cNvGrpSpPr/>
+        <p:nvPr/>
+      </p:nvGrpSpPr>
+      <p:grpSpPr>
+        <a:xfrm>
+          <a:off x="0" y="0"/>
+          <a:ext cx="0" cy="0"/>
+          <a:chOff x="0" y="0"/>
+          <a:chExt cx="0" cy="0"/>
+        </a:xfrm>
+      </p:grpSpPr>
+      <p:sp>
+        <p:nvSpPr>
+          <p:cNvPr id="3" name="Title 2"/>
+          <p:cNvSpPr>
+            <a:spLocks noGrp="1"/>
+          </p:cNvSpPr>
+          <p:nvPr>
+            <p:ph type="title"/>
+          </p:nvPr>
+        </p:nvSpPr>
+        <p:spPr/>
+        <p:txBody>
+          <a:bodyPr>
+            <a:normAutofit/>
+          </a:bodyPr>
+          <a:lstStyle/>
+          <a:p>
+            <a:r>
+              <a:rPr lang="en-US" dirty="0" smtClean="0"/>
+              <a:t>TVAAS Ranking</a:t>
+            </a:r>
+            <a:endParaRPr lang="en-US" dirty="0"/>
+          </a:p>
+        </p:txBody>
+      </p:sp>
+      <p:pic>
+        <p:nvPicPr>
+          <p:cNvPr id="4" name="Content Placeholder 3"/>
+          <p:cNvPicPr>
+            <a:picLocks noGrp="1" noChangeAspect="1"/>
+          </p:cNvPicPr>
+          <p:nvPr>
+            <p:ph idx="1"/>
+          </p:nvPr>
+        </p:nvPicPr>
+        <p:blipFill>
+          <a:blip r:embed="rId3" cstate="print">
+            <a:extLst>
+              <a:ext uri="{28A0092B-C50C-407E-A947-70E740481C1C}">
+                <a14:useLocalDpi xmlns:a14="http://schemas.microsoft.com/office/drawing/2010/main" val="0"/>
+              </a:ext>
+            </a:extLst>
+          </a:blip>
+          <a:stretch>
+            <a:fillRect/>
+          </a:stretch>
+        </p:blipFill>
+        <p:spPr/>
+      </p:pic>
+    </p:spTree>
+    <p:extLst>
+      <p:ext uri="{BB962C8B-B14F-4D97-AF65-F5344CB8AC3E}">
+        <p14:creationId xmlns:p14="http://schemas.microsoft.com/office/powerpoint/2010/main" val="2130940626"/>
+      </p:ext>
+    </p:extLst>
+  </p:cSld>
+  <p:clrMapOvr>
+    <a:masterClrMapping/>
+  </p:clrMapOvr>
+  <p:timing>
+    <p:tnLst>
+      <p:par>
+        <p:cTn id="1" dur="indefinite" restart="never" nodeType="tmRoot"/>
+      </p:par>
+    </p:tnLst>
+  </p:timing>
+</p:sld>
+</file>
+
+<file path=ppt/slides/slide14.xml><?xml version="1.0" encoding="utf-8"?>
+<p:sld xmlns:a="http://schemas.openxmlformats.org/drawingml/2006/main" xmlns:r="http://schemas.openxmlformats.org/officeDocument/2006/relationships" xmlns:p="http://schemas.openxmlformats.org/presentationml/2006/main">
+  <p:cSld>
+    <p:spTree>
+      <p:nvGrpSpPr>
+        <p:cNvPr id="1" name=""/>
+        <p:cNvGrpSpPr/>
+        <p:nvPr/>
+      </p:nvGrpSpPr>
+      <p:grpSpPr>
+        <a:xfrm>
+          <a:off x="0" y="0"/>
+          <a:ext cx="0" cy="0"/>
+          <a:chOff x="0" y="0"/>
+          <a:chExt cx="0" cy="0"/>
+        </a:xfrm>
+      </p:grpSpPr>
+    </p:spTree>
+    <p:extLst>
+      <p:ext uri="{BB962C8B-B14F-4D97-AF65-F5344CB8AC3E}">
+        <p14:creationId xmlns:p14="http://schemas.microsoft.com/office/powerpoint/2010/main" val="19955025"/>
+      </p:ext>
+    </p:extLst>
+  </p:cSld>
+  <p:clrMapOvr>
+    <a:masterClrMapping/>
+  </p:clrMapOvr>
+</p:sld>
+</file>
+
 <file path=ppt/slides/slide2.xml><?xml version="1.0" encoding="utf-8"?>
 <p:sld xmlns:a="http://schemas.openxmlformats.org/drawingml/2006/main" xmlns:r="http://schemas.openxmlformats.org/officeDocument/2006/relationships" xmlns:p="http://schemas.openxmlformats.org/presentationml/2006/main">
   <p:cSld>
@@ -10736,6 +11626,10 @@
           </a:bodyPr>
           <a:lstStyle/>
           <a:p>
+            <a:r>
+              <a:rPr lang="en-US" dirty="0" smtClean="0"/>
+              <a:t>TCAP Percentiles</a:t>
+            </a:r>
             <a:endParaRPr lang="en-US" dirty="0"/>
           </a:p>
         </p:txBody>
@@ -10900,6 +11794,10 @@
           </a:bodyPr>
           <a:lstStyle/>
           <a:p>
+            <a:r>
+              <a:rPr lang="en-US" dirty="0"/>
+              <a:t>TCAP Percentiles</a:t>
+            </a:r>
             <a:endParaRPr lang="en-US" dirty="0"/>
           </a:p>
         </p:txBody>
@@ -10982,6 +11880,10 @@
           </a:bodyPr>
           <a:lstStyle/>
           <a:p>
+            <a:r>
+              <a:rPr lang="en-US" dirty="0"/>
+              <a:t>TCAP Percentiles</a:t>
+            </a:r>
             <a:endParaRPr lang="en-US" dirty="0"/>
           </a:p>
         </p:txBody>
@@ -11064,6 +11966,10 @@
           </a:bodyPr>
           <a:lstStyle/>
           <a:p>
+            <a:r>
+              <a:rPr lang="en-US" dirty="0"/>
+              <a:t>TCAP Percentiles</a:t>
+            </a:r>
             <a:endParaRPr lang="en-US" dirty="0"/>
           </a:p>
         </p:txBody>
@@ -11146,6 +12052,10 @@
           </a:bodyPr>
           <a:lstStyle/>
           <a:p>
+            <a:r>
+              <a:rPr lang="en-US" dirty="0"/>
+              <a:t>TCAP Percentiles</a:t>
+            </a:r>
             <a:endParaRPr lang="en-US" dirty="0"/>
           </a:p>
         </p:txBody>
@@ -11211,16 +12121,158 @@
           <a:chExt cx="0" cy="0"/>
         </a:xfrm>
       </p:grpSpPr>
+      <p:sp>
+        <p:nvSpPr>
+          <p:cNvPr id="3" name="Title 2"/>
+          <p:cNvSpPr>
+            <a:spLocks noGrp="1"/>
+          </p:cNvSpPr>
+          <p:nvPr>
+            <p:ph type="title"/>
+          </p:nvPr>
+        </p:nvSpPr>
+        <p:spPr/>
+        <p:txBody>
+          <a:bodyPr>
+            <a:normAutofit/>
+          </a:bodyPr>
+          <a:lstStyle/>
+          <a:p>
+            <a:r>
+              <a:rPr lang="en-US" dirty="0"/>
+              <a:t>TVAAS Ranking</a:t>
+            </a:r>
+            <a:endParaRPr lang="en-US" dirty="0"/>
+          </a:p>
+        </p:txBody>
+      </p:sp>
+      <p:pic>
+        <p:nvPicPr>
+          <p:cNvPr id="6" name="Content Placeholder 5"/>
+          <p:cNvPicPr>
+            <a:picLocks noGrp="1" noChangeAspect="1"/>
+          </p:cNvPicPr>
+          <p:nvPr>
+            <p:ph idx="1"/>
+          </p:nvPr>
+        </p:nvPicPr>
+        <p:blipFill>
+          <a:blip r:embed="rId3" cstate="print">
+            <a:extLst>
+              <a:ext uri="{28A0092B-C50C-407E-A947-70E740481C1C}">
+                <a14:useLocalDpi xmlns:a14="http://schemas.microsoft.com/office/drawing/2010/main" val="0"/>
+              </a:ext>
+            </a:extLst>
+          </a:blip>
+          <a:stretch>
+            <a:fillRect/>
+          </a:stretch>
+        </p:blipFill>
+        <p:spPr/>
+      </p:pic>
     </p:spTree>
     <p:extLst>
       <p:ext uri="{BB962C8B-B14F-4D97-AF65-F5344CB8AC3E}">
-        <p14:creationId xmlns:p14="http://schemas.microsoft.com/office/powerpoint/2010/main" val="19955025"/>
+        <p14:creationId xmlns:p14="http://schemas.microsoft.com/office/powerpoint/2010/main" val="1691123598"/>
       </p:ext>
     </p:extLst>
   </p:cSld>
   <p:clrMapOvr>
     <a:masterClrMapping/>
   </p:clrMapOvr>
+  <p:timing>
+    <p:tnLst>
+      <p:par>
+        <p:cTn id="1" dur="indefinite" restart="never" nodeType="tmRoot"/>
+      </p:par>
+    </p:tnLst>
+  </p:timing>
+</p:sld>
+</file>
+
+<file path=ppt/slides/slide9.xml><?xml version="1.0" encoding="utf-8"?>
+<p:sld xmlns:a="http://schemas.openxmlformats.org/drawingml/2006/main" xmlns:r="http://schemas.openxmlformats.org/officeDocument/2006/relationships" xmlns:p="http://schemas.openxmlformats.org/presentationml/2006/main">
+  <p:cSld>
+    <p:spTree>
+      <p:nvGrpSpPr>
+        <p:cNvPr id="1" name=""/>
+        <p:cNvGrpSpPr/>
+        <p:nvPr/>
+      </p:nvGrpSpPr>
+      <p:grpSpPr>
+        <a:xfrm>
+          <a:off x="0" y="0"/>
+          <a:ext cx="0" cy="0"/>
+          <a:chOff x="0" y="0"/>
+          <a:chExt cx="0" cy="0"/>
+        </a:xfrm>
+      </p:grpSpPr>
+      <p:sp>
+        <p:nvSpPr>
+          <p:cNvPr id="3" name="Title 2"/>
+          <p:cNvSpPr>
+            <a:spLocks noGrp="1"/>
+          </p:cNvSpPr>
+          <p:nvPr>
+            <p:ph type="title"/>
+          </p:nvPr>
+        </p:nvSpPr>
+        <p:spPr/>
+        <p:txBody>
+          <a:bodyPr>
+            <a:normAutofit/>
+          </a:bodyPr>
+          <a:lstStyle/>
+          <a:p>
+            <a:r>
+              <a:rPr lang="en-US" dirty="0"/>
+              <a:t>TVAAS Ranking</a:t>
+            </a:r>
+            <a:endParaRPr lang="en-US" dirty="0"/>
+          </a:p>
+        </p:txBody>
+      </p:sp>
+      <p:pic>
+        <p:nvPicPr>
+          <p:cNvPr id="4" name="Content Placeholder 3"/>
+          <p:cNvPicPr>
+            <a:picLocks noGrp="1" noChangeAspect="1"/>
+          </p:cNvPicPr>
+          <p:nvPr>
+            <p:ph idx="1"/>
+          </p:nvPr>
+        </p:nvPicPr>
+        <p:blipFill>
+          <a:blip r:embed="rId3" cstate="print">
+            <a:extLst>
+              <a:ext uri="{28A0092B-C50C-407E-A947-70E740481C1C}">
+                <a14:useLocalDpi xmlns:a14="http://schemas.microsoft.com/office/drawing/2010/main" val="0"/>
+              </a:ext>
+            </a:extLst>
+          </a:blip>
+          <a:stretch>
+            <a:fillRect/>
+          </a:stretch>
+        </p:blipFill>
+        <p:spPr/>
+      </p:pic>
+    </p:spTree>
+    <p:extLst>
+      <p:ext uri="{BB962C8B-B14F-4D97-AF65-F5344CB8AC3E}">
+        <p14:creationId xmlns:p14="http://schemas.microsoft.com/office/powerpoint/2010/main" val="583615082"/>
+      </p:ext>
+    </p:extLst>
+  </p:cSld>
+  <p:clrMapOvr>
+    <a:masterClrMapping/>
+  </p:clrMapOvr>
+  <p:timing>
+    <p:tnLst>
+      <p:par>
+        <p:cTn id="1" dur="indefinite" restart="never" nodeType="tmRoot"/>
+      </p:par>
+    </p:tnLst>
+  </p:timing>
 </p:sld>
 </file>
 

</xml_diff>